<commit_message>
Plots in BI and Presentation
</commit_message>
<xml_diff>
--- a/Churn_Case.pptx
+++ b/Churn_Case.pptx
@@ -13,7 +13,8 @@
     <p:sldId id="262" r:id="rId7"/>
     <p:sldId id="260" r:id="rId8"/>
     <p:sldId id="261" r:id="rId9"/>
-    <p:sldId id="266" r:id="rId10"/>
+    <p:sldId id="267" r:id="rId10"/>
+    <p:sldId id="266" r:id="rId11"/>
   </p:sldIdLst>
   <p:sldSz cx="12192000" cy="6858000"/>
   <p:notesSz cx="6858000" cy="9144000"/>
@@ -125,6 +126,7 @@
             <p14:sldId id="262"/>
             <p14:sldId id="260"/>
             <p14:sldId id="261"/>
+            <p14:sldId id="267"/>
             <p14:sldId id="266"/>
           </p14:sldIdLst>
         </p14:section>
@@ -338,7 +340,7 @@
           <a:p>
             <a:fld id="{2C7F5CE0-1D69-41A0-A371-CDBADD15EC88}" type="slidenum">
               <a:rPr lang="pt-BR" smtClean="0"/>
-              <a:t>‹#›</a:t>
+              <a:t>‹nº›</a:t>
             </a:fld>
             <a:endParaRPr lang="pt-BR"/>
           </a:p>
@@ -536,7 +538,7 @@
           <a:p>
             <a:fld id="{2C7F5CE0-1D69-41A0-A371-CDBADD15EC88}" type="slidenum">
               <a:rPr lang="pt-BR" smtClean="0"/>
-              <a:t>‹#›</a:t>
+              <a:t>‹nº›</a:t>
             </a:fld>
             <a:endParaRPr lang="pt-BR"/>
           </a:p>
@@ -744,7 +746,7 @@
           <a:p>
             <a:fld id="{2C7F5CE0-1D69-41A0-A371-CDBADD15EC88}" type="slidenum">
               <a:rPr lang="pt-BR" smtClean="0"/>
-              <a:t>‹#›</a:t>
+              <a:t>‹nº›</a:t>
             </a:fld>
             <a:endParaRPr lang="pt-BR"/>
           </a:p>
@@ -942,7 +944,7 @@
           <a:p>
             <a:fld id="{2C7F5CE0-1D69-41A0-A371-CDBADD15EC88}" type="slidenum">
               <a:rPr lang="pt-BR" smtClean="0"/>
-              <a:t>‹#›</a:t>
+              <a:t>‹nº›</a:t>
             </a:fld>
             <a:endParaRPr lang="pt-BR"/>
           </a:p>
@@ -1217,7 +1219,7 @@
           <a:p>
             <a:fld id="{2C7F5CE0-1D69-41A0-A371-CDBADD15EC88}" type="slidenum">
               <a:rPr lang="pt-BR" smtClean="0"/>
-              <a:t>‹#›</a:t>
+              <a:t>‹nº›</a:t>
             </a:fld>
             <a:endParaRPr lang="pt-BR"/>
           </a:p>
@@ -1482,7 +1484,7 @@
           <a:p>
             <a:fld id="{2C7F5CE0-1D69-41A0-A371-CDBADD15EC88}" type="slidenum">
               <a:rPr lang="pt-BR" smtClean="0"/>
-              <a:t>‹#›</a:t>
+              <a:t>‹nº›</a:t>
             </a:fld>
             <a:endParaRPr lang="pt-BR"/>
           </a:p>
@@ -1894,7 +1896,7 @@
           <a:p>
             <a:fld id="{2C7F5CE0-1D69-41A0-A371-CDBADD15EC88}" type="slidenum">
               <a:rPr lang="pt-BR" smtClean="0"/>
-              <a:t>‹#›</a:t>
+              <a:t>‹nº›</a:t>
             </a:fld>
             <a:endParaRPr lang="pt-BR"/>
           </a:p>
@@ -2035,7 +2037,7 @@
           <a:p>
             <a:fld id="{2C7F5CE0-1D69-41A0-A371-CDBADD15EC88}" type="slidenum">
               <a:rPr lang="pt-BR" smtClean="0"/>
-              <a:t>‹#›</a:t>
+              <a:t>‹nº›</a:t>
             </a:fld>
             <a:endParaRPr lang="pt-BR"/>
           </a:p>
@@ -2148,7 +2150,7 @@
           <a:p>
             <a:fld id="{2C7F5CE0-1D69-41A0-A371-CDBADD15EC88}" type="slidenum">
               <a:rPr lang="pt-BR" smtClean="0"/>
-              <a:t>‹#›</a:t>
+              <a:t>‹nº›</a:t>
             </a:fld>
             <a:endParaRPr lang="pt-BR"/>
           </a:p>
@@ -2459,7 +2461,7 @@
           <a:p>
             <a:fld id="{2C7F5CE0-1D69-41A0-A371-CDBADD15EC88}" type="slidenum">
               <a:rPr lang="pt-BR" smtClean="0"/>
-              <a:t>‹#›</a:t>
+              <a:t>‹nº›</a:t>
             </a:fld>
             <a:endParaRPr lang="pt-BR"/>
           </a:p>
@@ -2747,7 +2749,7 @@
           <a:p>
             <a:fld id="{2C7F5CE0-1D69-41A0-A371-CDBADD15EC88}" type="slidenum">
               <a:rPr lang="pt-BR" smtClean="0"/>
-              <a:t>‹#›</a:t>
+              <a:t>‹nº›</a:t>
             </a:fld>
             <a:endParaRPr lang="pt-BR"/>
           </a:p>
@@ -3024,7 +3026,7 @@
           <a:p>
             <a:fld id="{2C7F5CE0-1D69-41A0-A371-CDBADD15EC88}" type="slidenum">
               <a:rPr lang="pt-BR" smtClean="0"/>
-              <a:t>‹#›</a:t>
+              <a:t>‹nº›</a:t>
             </a:fld>
             <a:endParaRPr lang="pt-BR"/>
           </a:p>
@@ -3340,9 +3342,7 @@
     <p:bg>
       <p:bgPr>
         <a:solidFill>
-          <a:schemeClr val="bg1">
-            <a:lumMod val="85000"/>
-          </a:schemeClr>
+          <a:srgbClr val="E6E6E6"/>
         </a:solidFill>
         <a:effectLst/>
       </p:bgPr>
@@ -3438,15 +3438,51 @@
 </p:sld>
 </file>
 
+<file path=ppt/slides/slide10.xml><?xml version="1.0" encoding="utf-8"?>
+<p:sld xmlns:a="http://schemas.openxmlformats.org/drawingml/2006/main" xmlns:r="http://schemas.openxmlformats.org/officeDocument/2006/relationships" xmlns:p="http://schemas.openxmlformats.org/presentationml/2006/main">
+  <p:cSld>
+    <p:bg>
+      <p:bgPr>
+        <a:solidFill>
+          <a:srgbClr val="E6E6E6"/>
+        </a:solidFill>
+        <a:effectLst/>
+      </p:bgPr>
+    </p:bg>
+    <p:spTree>
+      <p:nvGrpSpPr>
+        <p:cNvPr id="1" name=""/>
+        <p:cNvGrpSpPr/>
+        <p:nvPr/>
+      </p:nvGrpSpPr>
+      <p:grpSpPr>
+        <a:xfrm>
+          <a:off x="0" y="0"/>
+          <a:ext cx="0" cy="0"/>
+          <a:chOff x="0" y="0"/>
+          <a:chExt cx="0" cy="0"/>
+        </a:xfrm>
+      </p:grpSpPr>
+    </p:spTree>
+    <p:extLst>
+      <p:ext uri="{BB962C8B-B14F-4D97-AF65-F5344CB8AC3E}">
+        <p14:creationId xmlns:p14="http://schemas.microsoft.com/office/powerpoint/2010/main" val="324028868"/>
+      </p:ext>
+    </p:extLst>
+  </p:cSld>
+  <p:clrMapOvr>
+    <a:masterClrMapping/>
+  </p:clrMapOvr>
+</p:sld>
+</file>
+
 <file path=ppt/slides/slide2.xml><?xml version="1.0" encoding="utf-8"?>
 <p:sld xmlns:a="http://schemas.openxmlformats.org/drawingml/2006/main" xmlns:r="http://schemas.openxmlformats.org/officeDocument/2006/relationships" xmlns:p="http://schemas.openxmlformats.org/presentationml/2006/main">
   <p:cSld>
     <p:bg>
       <p:bgPr>
         <a:solidFill>
-          <a:schemeClr val="bg1">
-            <a:lumMod val="85000"/>
-          </a:schemeClr>
+          <a:srgbClr val="E6E6E6"/>
         </a:solidFill>
         <a:effectLst/>
       </p:bgPr>
@@ -3630,9 +3666,7 @@
     <p:bg>
       <p:bgPr>
         <a:solidFill>
-          <a:schemeClr val="bg1">
-            <a:lumMod val="85000"/>
-          </a:schemeClr>
+          <a:srgbClr val="E6E6E6"/>
         </a:solidFill>
         <a:effectLst/>
       </p:bgPr>
@@ -4409,9 +4443,7 @@
     <p:bg>
       <p:bgPr>
         <a:solidFill>
-          <a:schemeClr val="bg1">
-            <a:lumMod val="85000"/>
-          </a:schemeClr>
+          <a:srgbClr val="E6E6E6"/>
         </a:solidFill>
         <a:effectLst/>
       </p:bgPr>
@@ -4839,7 +4871,7 @@
         </p:nvSpPr>
         <p:spPr>
           <a:xfrm>
-            <a:off x="8569719" y="1064125"/>
+            <a:off x="7627610" y="3505319"/>
             <a:ext cx="6094520" cy="369332"/>
           </a:xfrm>
           <a:prstGeom prst="rect">
@@ -4894,7 +4926,7 @@
         </p:nvSpPr>
         <p:spPr>
           <a:xfrm>
-            <a:off x="7171209" y="-24102"/>
+            <a:off x="6282515" y="2778915"/>
             <a:ext cx="5334464" cy="1200329"/>
           </a:xfrm>
           <a:prstGeom prst="rect">
@@ -5026,7 +5058,7 @@
         </p:blipFill>
         <p:spPr>
           <a:xfrm>
-            <a:off x="838200" y="2778915"/>
+            <a:off x="820942" y="2778915"/>
             <a:ext cx="10550115" cy="3798042"/>
           </a:xfrm>
           <a:prstGeom prst="rect">
@@ -5624,9 +5656,7 @@
     <p:bg>
       <p:bgPr>
         <a:solidFill>
-          <a:schemeClr val="bg1">
-            <a:lumMod val="85000"/>
-          </a:schemeClr>
+          <a:srgbClr val="E6E6E6"/>
         </a:solidFill>
         <a:effectLst/>
       </p:bgPr>
@@ -5647,185 +5677,74 @@
       </p:grpSpPr>
       <p:sp>
         <p:nvSpPr>
-          <p:cNvPr id="12" name="CaixaDeTexto 11">
-            <a:extLst>
-              <a:ext uri="{FF2B5EF4-FFF2-40B4-BE49-F238E27FC236}">
-                <a16:creationId xmlns:a16="http://schemas.microsoft.com/office/drawing/2014/main" id="{7D80EAA1-E6F5-44A7-B090-5A6DD87181AA}"/>
-              </a:ext>
-            </a:extLst>
-          </p:cNvPr>
-          <p:cNvSpPr txBox="1"/>
-          <p:nvPr/>
+          <p:cNvPr id="5" name="Título 1">
+            <a:extLst>
+              <a:ext uri="{FF2B5EF4-FFF2-40B4-BE49-F238E27FC236}">
+                <a16:creationId xmlns:a16="http://schemas.microsoft.com/office/drawing/2014/main" id="{2A3EB239-F926-4171-8382-D0445F15F42B}"/>
+              </a:ext>
+            </a:extLst>
+          </p:cNvPr>
+          <p:cNvSpPr>
+            <a:spLocks noGrp="1"/>
+          </p:cNvSpPr>
+          <p:nvPr>
+            <p:ph type="title"/>
+          </p:nvPr>
         </p:nvSpPr>
         <p:spPr>
           <a:xfrm>
-            <a:off x="6533957" y="3864317"/>
-            <a:ext cx="6094520" cy="369332"/>
+            <a:off x="838200" y="365125"/>
+            <a:ext cx="10515600" cy="1325563"/>
+          </a:xfrm>
+        </p:spPr>
+        <p:txBody>
+          <a:bodyPr/>
+          <a:lstStyle/>
+          <a:p>
+            <a:r>
+              <a:rPr lang="pt-BR" dirty="0">
+                <a:latin typeface="Segoe UI" panose="020B0502040204020203" pitchFamily="34" charset="0"/>
+                <a:cs typeface="Segoe UI" panose="020B0502040204020203" pitchFamily="34" charset="0"/>
+              </a:rPr>
+              <a:t>Clientes Ativos x Cancelaram</a:t>
+            </a:r>
+          </a:p>
+        </p:txBody>
+      </p:sp>
+      <p:pic>
+        <p:nvPicPr>
+          <p:cNvPr id="13" name="Imagem 12">
+            <a:extLst>
+              <a:ext uri="{FF2B5EF4-FFF2-40B4-BE49-F238E27FC236}">
+                <a16:creationId xmlns:a16="http://schemas.microsoft.com/office/drawing/2014/main" id="{9B06C45A-6879-475A-B83B-467E5A454C8A}"/>
+              </a:ext>
+            </a:extLst>
+          </p:cNvPr>
+          <p:cNvPicPr>
+            <a:picLocks noChangeAspect="1"/>
+          </p:cNvPicPr>
+          <p:nvPr/>
+        </p:nvPicPr>
+        <p:blipFill>
+          <a:blip r:embed="rId2"/>
+          <a:stretch>
+            <a:fillRect/>
+          </a:stretch>
+        </p:blipFill>
+        <p:spPr>
+          <a:xfrm>
+            <a:off x="4553307" y="1586273"/>
+            <a:ext cx="7297168" cy="5163271"/>
           </a:xfrm>
           <a:prstGeom prst="rect">
             <a:avLst/>
           </a:prstGeom>
-          <a:noFill/>
         </p:spPr>
-        <p:txBody>
-          <a:bodyPr wrap="square">
-            <a:spAutoFit/>
-          </a:bodyPr>
-          <a:lstStyle/>
-          <a:p>
-            <a:r>
-              <a:rPr lang="pt-BR" sz="1800" b="0" i="0" u="none" strike="noStrike" dirty="0">
-                <a:solidFill>
-                  <a:srgbClr val="000000"/>
-                </a:solidFill>
-                <a:effectLst/>
-                <a:latin typeface="Calibri" panose="020F0502020204030204" pitchFamily="34" charset="0"/>
-              </a:rPr>
-              <a:t>17,0%</a:t>
-            </a:r>
-            <a:r>
-              <a:rPr lang="pt-BR" dirty="0"/>
-              <a:t> </a:t>
-            </a:r>
-          </a:p>
-        </p:txBody>
-      </p:sp>
-      <p:sp>
-        <p:nvSpPr>
-          <p:cNvPr id="16" name="CaixaDeTexto 15">
-            <a:extLst>
-              <a:ext uri="{FF2B5EF4-FFF2-40B4-BE49-F238E27FC236}">
-                <a16:creationId xmlns:a16="http://schemas.microsoft.com/office/drawing/2014/main" id="{07EFBDB0-198B-4571-BDD9-B92FA43B1D60}"/>
-              </a:ext>
-            </a:extLst>
-          </p:cNvPr>
-          <p:cNvSpPr txBox="1"/>
-          <p:nvPr/>
-        </p:nvSpPr>
-        <p:spPr>
-          <a:xfrm>
-            <a:off x="7919353" y="4152248"/>
-            <a:ext cx="6312022" cy="369332"/>
-          </a:xfrm>
-          <a:prstGeom prst="rect">
-            <a:avLst/>
-          </a:prstGeom>
-          <a:noFill/>
-        </p:spPr>
-        <p:txBody>
-          <a:bodyPr wrap="square">
-            <a:spAutoFit/>
-          </a:bodyPr>
-          <a:lstStyle/>
-          <a:p>
-            <a:r>
-              <a:rPr lang="pt-BR" sz="1800" b="0" i="0" u="none" strike="noStrike" dirty="0">
-                <a:solidFill>
-                  <a:srgbClr val="000000"/>
-                </a:solidFill>
-                <a:effectLst/>
-                <a:latin typeface="Calibri" panose="020F0502020204030204" pitchFamily="34" charset="0"/>
-              </a:rPr>
-              <a:t>37,7%</a:t>
-            </a:r>
-            <a:r>
-              <a:rPr lang="pt-BR" dirty="0"/>
-              <a:t> </a:t>
-            </a:r>
-          </a:p>
-        </p:txBody>
-      </p:sp>
-      <p:sp>
-        <p:nvSpPr>
-          <p:cNvPr id="19" name="CaixaDeTexto 18">
-            <a:extLst>
-              <a:ext uri="{FF2B5EF4-FFF2-40B4-BE49-F238E27FC236}">
-                <a16:creationId xmlns:a16="http://schemas.microsoft.com/office/drawing/2014/main" id="{4082F9E3-BDFF-44AE-B893-D7A62CDA874A}"/>
-              </a:ext>
-            </a:extLst>
-          </p:cNvPr>
-          <p:cNvSpPr txBox="1"/>
-          <p:nvPr/>
-        </p:nvSpPr>
-        <p:spPr>
-          <a:xfrm>
-            <a:off x="9384412" y="4178432"/>
-            <a:ext cx="7116024" cy="369332"/>
-          </a:xfrm>
-          <a:prstGeom prst="rect">
-            <a:avLst/>
-          </a:prstGeom>
-          <a:noFill/>
-        </p:spPr>
-        <p:txBody>
-          <a:bodyPr wrap="square">
-            <a:spAutoFit/>
-          </a:bodyPr>
-          <a:lstStyle/>
-          <a:p>
-            <a:r>
-              <a:rPr lang="pt-BR" sz="1800" b="0" i="0" u="none" strike="noStrike" dirty="0">
-                <a:solidFill>
-                  <a:srgbClr val="000000"/>
-                </a:solidFill>
-                <a:effectLst/>
-                <a:latin typeface="Calibri" panose="020F0502020204030204" pitchFamily="34" charset="0"/>
-              </a:rPr>
-              <a:t>15,5%</a:t>
-            </a:r>
-            <a:r>
-              <a:rPr lang="pt-BR" dirty="0"/>
-              <a:t> </a:t>
-            </a:r>
-          </a:p>
-        </p:txBody>
-      </p:sp>
-      <p:sp>
-        <p:nvSpPr>
-          <p:cNvPr id="5" name="Espaço Reservado para Conteúdo 4">
-            <a:extLst>
-              <a:ext uri="{FF2B5EF4-FFF2-40B4-BE49-F238E27FC236}">
-                <a16:creationId xmlns:a16="http://schemas.microsoft.com/office/drawing/2014/main" id="{29A619DD-944B-40D5-9B57-958B9EE6E638}"/>
-              </a:ext>
-            </a:extLst>
-          </p:cNvPr>
-          <p:cNvSpPr>
-            <a:spLocks noGrp="1"/>
-          </p:cNvSpPr>
-          <p:nvPr>
-            <p:ph idx="1"/>
-          </p:nvPr>
-        </p:nvSpPr>
-        <p:spPr/>
-        <p:txBody>
-          <a:bodyPr/>
-          <a:lstStyle/>
-          <a:p>
-            <a:r>
-              <a:rPr lang="pt-BR" dirty="0"/>
-              <a:t>Comparar perfil ativo x </a:t>
-            </a:r>
-            <a:r>
-              <a:rPr lang="pt-BR" dirty="0" err="1"/>
-              <a:t>Churn</a:t>
-            </a:r>
-            <a:endParaRPr lang="pt-BR" dirty="0"/>
-          </a:p>
-          <a:p>
-            <a:r>
-              <a:rPr lang="pt-BR" dirty="0"/>
-              <a:t>Quem não compra nada </a:t>
-            </a:r>
-          </a:p>
-          <a:p>
-            <a:endParaRPr lang="pt-BR" dirty="0"/>
-          </a:p>
-        </p:txBody>
-      </p:sp>
+      </p:pic>
     </p:spTree>
     <p:extLst>
       <p:ext uri="{BB962C8B-B14F-4D97-AF65-F5344CB8AC3E}">
-        <p14:creationId xmlns:p14="http://schemas.microsoft.com/office/powerpoint/2010/main" val="324028868"/>
+        <p14:creationId xmlns:p14="http://schemas.microsoft.com/office/powerpoint/2010/main" val="2597250642"/>
       </p:ext>
     </p:extLst>
   </p:cSld>

</xml_diff>